<commit_message>
Revert "Add files via upload"
</commit_message>
<xml_diff>
--- a/Prototype SOP Systems v1.5 - working .pptx
+++ b/Prototype SOP Systems v1.5 - working .pptx
@@ -325,7 +325,7 @@
           <a:p>
             <a:fld id="{09015F1A-6AD8-4DF6-B736-0457EB903716}" type="datetimeFigureOut">
               <a:rPr lang="he-IL" smtClean="0"/>
-              <a:t>י"ב/כסלו/תשע"ט</a:t>
+              <a:t>י'/כסלו/תשע"ט</a:t>
             </a:fld>
             <a:endParaRPr lang="he-IL"/>
           </a:p>
@@ -600,7 +600,7 @@
           <a:p>
             <a:fld id="{09015F1A-6AD8-4DF6-B736-0457EB903716}" type="datetimeFigureOut">
               <a:rPr lang="he-IL" smtClean="0"/>
-              <a:t>י"ב/כסלו/תשע"ט</a:t>
+              <a:t>י'/כסלו/תשע"ט</a:t>
             </a:fld>
             <a:endParaRPr lang="he-IL"/>
           </a:p>
@@ -794,7 +794,7 @@
           <a:p>
             <a:fld id="{09015F1A-6AD8-4DF6-B736-0457EB903716}" type="datetimeFigureOut">
               <a:rPr lang="he-IL" smtClean="0"/>
-              <a:t>י"ב/כסלו/תשע"ט</a:t>
+              <a:t>י'/כסלו/תשע"ט</a:t>
             </a:fld>
             <a:endParaRPr lang="he-IL"/>
           </a:p>
@@ -1067,7 +1067,7 @@
           <a:p>
             <a:fld id="{09015F1A-6AD8-4DF6-B736-0457EB903716}" type="datetimeFigureOut">
               <a:rPr lang="he-IL" smtClean="0"/>
-              <a:t>י"ב/כסלו/תשע"ט</a:t>
+              <a:t>י'/כסלו/תשע"ט</a:t>
             </a:fld>
             <a:endParaRPr lang="he-IL"/>
           </a:p>
@@ -1408,7 +1408,7 @@
           <a:p>
             <a:fld id="{09015F1A-6AD8-4DF6-B736-0457EB903716}" type="datetimeFigureOut">
               <a:rPr lang="he-IL" smtClean="0"/>
-              <a:t>י"ב/כסלו/תשע"ט</a:t>
+              <a:t>י'/כסלו/תשע"ט</a:t>
             </a:fld>
             <a:endParaRPr lang="he-IL"/>
           </a:p>
@@ -2031,7 +2031,7 @@
           <a:p>
             <a:fld id="{09015F1A-6AD8-4DF6-B736-0457EB903716}" type="datetimeFigureOut">
               <a:rPr lang="he-IL" smtClean="0"/>
-              <a:t>י"ב/כסלו/תשע"ט</a:t>
+              <a:t>י'/כסלו/תשע"ט</a:t>
             </a:fld>
             <a:endParaRPr lang="he-IL"/>
           </a:p>
@@ -2891,7 +2891,7 @@
           <a:p>
             <a:fld id="{09015F1A-6AD8-4DF6-B736-0457EB903716}" type="datetimeFigureOut">
               <a:rPr lang="he-IL" smtClean="0"/>
-              <a:t>י"ב/כסלו/תשע"ט</a:t>
+              <a:t>י'/כסלו/תשע"ט</a:t>
             </a:fld>
             <a:endParaRPr lang="he-IL"/>
           </a:p>
@@ -3061,7 +3061,7 @@
           <a:p>
             <a:fld id="{09015F1A-6AD8-4DF6-B736-0457EB903716}" type="datetimeFigureOut">
               <a:rPr lang="he-IL" smtClean="0"/>
-              <a:t>י"ב/כסלו/תשע"ט</a:t>
+              <a:t>י'/כסלו/תשע"ט</a:t>
             </a:fld>
             <a:endParaRPr lang="he-IL"/>
           </a:p>
@@ -3241,7 +3241,7 @@
           <a:p>
             <a:fld id="{09015F1A-6AD8-4DF6-B736-0457EB903716}" type="datetimeFigureOut">
               <a:rPr lang="he-IL" smtClean="0"/>
-              <a:t>י"ב/כסלו/תשע"ט</a:t>
+              <a:t>י'/כסלו/תשע"ט</a:t>
             </a:fld>
             <a:endParaRPr lang="he-IL"/>
           </a:p>
@@ -3411,7 +3411,7 @@
           <a:p>
             <a:fld id="{09015F1A-6AD8-4DF6-B736-0457EB903716}" type="datetimeFigureOut">
               <a:rPr lang="he-IL" smtClean="0"/>
-              <a:t>י"ב/כסלו/תשע"ט</a:t>
+              <a:t>י'/כסלו/תשע"ט</a:t>
             </a:fld>
             <a:endParaRPr lang="he-IL"/>
           </a:p>
@@ -3658,7 +3658,7 @@
           <a:p>
             <a:fld id="{09015F1A-6AD8-4DF6-B736-0457EB903716}" type="datetimeFigureOut">
               <a:rPr lang="he-IL" smtClean="0"/>
-              <a:t>י"ב/כסלו/תשע"ט</a:t>
+              <a:t>י'/כסלו/תשע"ט</a:t>
             </a:fld>
             <a:endParaRPr lang="he-IL"/>
           </a:p>
@@ -3950,7 +3950,7 @@
           <a:p>
             <a:fld id="{09015F1A-6AD8-4DF6-B736-0457EB903716}" type="datetimeFigureOut">
               <a:rPr lang="he-IL" smtClean="0"/>
-              <a:t>י"ב/כסלו/תשע"ט</a:t>
+              <a:t>י'/כסלו/תשע"ט</a:t>
             </a:fld>
             <a:endParaRPr lang="he-IL"/>
           </a:p>
@@ -4394,7 +4394,7 @@
           <a:p>
             <a:fld id="{09015F1A-6AD8-4DF6-B736-0457EB903716}" type="datetimeFigureOut">
               <a:rPr lang="he-IL" smtClean="0"/>
-              <a:t>י"ב/כסלו/תשע"ט</a:t>
+              <a:t>י'/כסלו/תשע"ט</a:t>
             </a:fld>
             <a:endParaRPr lang="he-IL"/>
           </a:p>
@@ -4512,7 +4512,7 @@
           <a:p>
             <a:fld id="{09015F1A-6AD8-4DF6-B736-0457EB903716}" type="datetimeFigureOut">
               <a:rPr lang="he-IL" smtClean="0"/>
-              <a:t>י"ב/כסלו/תשע"ט</a:t>
+              <a:t>י'/כסלו/תשע"ט</a:t>
             </a:fld>
             <a:endParaRPr lang="he-IL"/>
           </a:p>
@@ -4607,7 +4607,7 @@
           <a:p>
             <a:fld id="{09015F1A-6AD8-4DF6-B736-0457EB903716}" type="datetimeFigureOut">
               <a:rPr lang="he-IL" smtClean="0"/>
-              <a:t>י"ב/כסלו/תשע"ט</a:t>
+              <a:t>י'/כסלו/תשע"ט</a:t>
             </a:fld>
             <a:endParaRPr lang="he-IL"/>
           </a:p>
@@ -4886,7 +4886,7 @@
           <a:p>
             <a:fld id="{09015F1A-6AD8-4DF6-B736-0457EB903716}" type="datetimeFigureOut">
               <a:rPr lang="he-IL" smtClean="0"/>
-              <a:t>י"ב/כסלו/תשע"ט</a:t>
+              <a:t>י'/כסלו/תשע"ט</a:t>
             </a:fld>
             <a:endParaRPr lang="he-IL"/>
           </a:p>
@@ -5161,7 +5161,7 @@
           <a:p>
             <a:fld id="{09015F1A-6AD8-4DF6-B736-0457EB903716}" type="datetimeFigureOut">
               <a:rPr lang="he-IL" smtClean="0"/>
-              <a:t>י"ב/כסלו/תשע"ט</a:t>
+              <a:t>י'/כסלו/תשע"ט</a:t>
             </a:fld>
             <a:endParaRPr lang="he-IL"/>
           </a:p>
@@ -5612,7 +5612,7 @@
           <a:p>
             <a:fld id="{09015F1A-6AD8-4DF6-B736-0457EB903716}" type="datetimeFigureOut">
               <a:rPr lang="he-IL" smtClean="0"/>
-              <a:t>י"ב/כסלו/תשע"ט</a:t>
+              <a:t>י'/כסלו/תשע"ט</a:t>
             </a:fld>
             <a:endParaRPr lang="he-IL"/>
           </a:p>
@@ -12460,6 +12460,56 @@
       </p:sp>
       <p:sp>
         <p:nvSpPr>
+          <p:cNvPr id="62" name="TextBox 61">
+            <a:extLst>
+              <a:ext uri="{FF2B5EF4-FFF2-40B4-BE49-F238E27FC236}">
+                <a16:creationId xmlns:a16="http://schemas.microsoft.com/office/drawing/2014/main" id="{8AEAAF76-09AF-4062-A0BB-B5973648EED5}"/>
+              </a:ext>
+            </a:extLst>
+          </p:cNvPr>
+          <p:cNvSpPr txBox="1"/>
+          <p:nvPr/>
+        </p:nvSpPr>
+        <p:spPr>
+          <a:xfrm>
+            <a:off x="10382546" y="4574427"/>
+            <a:ext cx="939563" cy="400110"/>
+          </a:xfrm>
+          <a:prstGeom prst="rect">
+            <a:avLst/>
+          </a:prstGeom>
+          <a:gradFill>
+            <a:gsLst>
+              <a:gs pos="41000">
+                <a:srgbClr val="C00000"/>
+              </a:gs>
+              <a:gs pos="100000">
+                <a:schemeClr val="accent5">
+                  <a:shade val="90000"/>
+                  <a:lumMod val="84000"/>
+                </a:schemeClr>
+              </a:gs>
+            </a:gsLst>
+            <a:lin ang="5400000" scaled="0"/>
+          </a:gradFill>
+        </p:spPr>
+        <p:txBody>
+          <a:bodyPr wrap="square" rtlCol="1">
+            <a:spAutoFit/>
+          </a:bodyPr>
+          <a:lstStyle/>
+          <a:p>
+            <a:pPr algn="ctr"/>
+            <a:r>
+              <a:rPr lang="en-US" sz="1000" dirty="0"/>
+              <a:t>REPRICING PRODUCTS</a:t>
+            </a:r>
+            <a:endParaRPr lang="he-IL" sz="1000" dirty="0"/>
+          </a:p>
+        </p:txBody>
+      </p:sp>
+      <p:sp>
+        <p:nvSpPr>
           <p:cNvPr id="63" name="TextBox 62">
             <a:extLst>
               <a:ext uri="{FF2B5EF4-FFF2-40B4-BE49-F238E27FC236}">
@@ -13829,56 +13879,6 @@
                 <a:schemeClr val="tx1"/>
               </a:solidFill>
             </a:endParaRPr>
-          </a:p>
-        </p:txBody>
-      </p:sp>
-      <p:sp>
-        <p:nvSpPr>
-          <p:cNvPr id="76" name="TextBox 75">
-            <a:extLst>
-              <a:ext uri="{FF2B5EF4-FFF2-40B4-BE49-F238E27FC236}">
-                <a16:creationId xmlns:a16="http://schemas.microsoft.com/office/drawing/2014/main" id="{581C6EB5-6FA0-439B-817B-C1DADC3AF249}"/>
-              </a:ext>
-            </a:extLst>
-          </p:cNvPr>
-          <p:cNvSpPr txBox="1"/>
-          <p:nvPr/>
-        </p:nvSpPr>
-        <p:spPr>
-          <a:xfrm>
-            <a:off x="10401537" y="4582940"/>
-            <a:ext cx="939563" cy="400110"/>
-          </a:xfrm>
-          <a:prstGeom prst="rect">
-            <a:avLst/>
-          </a:prstGeom>
-          <a:gradFill>
-            <a:gsLst>
-              <a:gs pos="41000">
-                <a:srgbClr val="C00000"/>
-              </a:gs>
-              <a:gs pos="100000">
-                <a:schemeClr val="accent5">
-                  <a:shade val="90000"/>
-                  <a:lumMod val="84000"/>
-                </a:schemeClr>
-              </a:gs>
-            </a:gsLst>
-            <a:lin ang="5400000" scaled="0"/>
-          </a:gradFill>
-        </p:spPr>
-        <p:txBody>
-          <a:bodyPr wrap="square" rtlCol="1">
-            <a:spAutoFit/>
-          </a:bodyPr>
-          <a:lstStyle/>
-          <a:p>
-            <a:pPr algn="ctr"/>
-            <a:r>
-              <a:rPr lang="en-US" sz="1000" dirty="0"/>
-              <a:t>REPRICING PRODUCTS</a:t>
-            </a:r>
-            <a:endParaRPr lang="he-IL" sz="1000" dirty="0"/>
           </a:p>
         </p:txBody>
       </p:sp>
@@ -21002,6 +21002,56 @@
       </p:sp>
       <p:sp>
         <p:nvSpPr>
+          <p:cNvPr id="106" name="TextBox 105">
+            <a:extLst>
+              <a:ext uri="{FF2B5EF4-FFF2-40B4-BE49-F238E27FC236}">
+                <a16:creationId xmlns:a16="http://schemas.microsoft.com/office/drawing/2014/main" id="{295F0A7A-0F76-41DC-9E3A-7D21F470209C}"/>
+              </a:ext>
+            </a:extLst>
+          </p:cNvPr>
+          <p:cNvSpPr txBox="1"/>
+          <p:nvPr/>
+        </p:nvSpPr>
+        <p:spPr>
+          <a:xfrm>
+            <a:off x="10374903" y="4582940"/>
+            <a:ext cx="939563" cy="400110"/>
+          </a:xfrm>
+          <a:prstGeom prst="rect">
+            <a:avLst/>
+          </a:prstGeom>
+          <a:gradFill>
+            <a:gsLst>
+              <a:gs pos="41000">
+                <a:srgbClr val="C00000"/>
+              </a:gs>
+              <a:gs pos="100000">
+                <a:schemeClr val="accent5">
+                  <a:shade val="90000"/>
+                  <a:lumMod val="84000"/>
+                </a:schemeClr>
+              </a:gs>
+            </a:gsLst>
+            <a:lin ang="5400000" scaled="0"/>
+          </a:gradFill>
+        </p:spPr>
+        <p:txBody>
+          <a:bodyPr wrap="square" rtlCol="1">
+            <a:spAutoFit/>
+          </a:bodyPr>
+          <a:lstStyle/>
+          <a:p>
+            <a:pPr algn="ctr"/>
+            <a:r>
+              <a:rPr lang="en-US" sz="1000" dirty="0"/>
+              <a:t>REPRICING PRODUCTS</a:t>
+            </a:r>
+            <a:endParaRPr lang="he-IL" sz="1000" dirty="0"/>
+          </a:p>
+        </p:txBody>
+      </p:sp>
+      <p:sp>
+        <p:nvSpPr>
           <p:cNvPr id="107" name="TextBox 106">
             <a:extLst>
               <a:ext uri="{FF2B5EF4-FFF2-40B4-BE49-F238E27FC236}">
@@ -22501,56 +22551,6 @@
                 <a:schemeClr val="tx1"/>
               </a:solidFill>
             </a:endParaRPr>
-          </a:p>
-        </p:txBody>
-      </p:sp>
-      <p:sp>
-        <p:nvSpPr>
-          <p:cNvPr id="44" name="TextBox 43">
-            <a:extLst>
-              <a:ext uri="{FF2B5EF4-FFF2-40B4-BE49-F238E27FC236}">
-                <a16:creationId xmlns:a16="http://schemas.microsoft.com/office/drawing/2014/main" id="{08F26DF3-BF85-484C-BE01-EEDB2FA37821}"/>
-              </a:ext>
-            </a:extLst>
-          </p:cNvPr>
-          <p:cNvSpPr txBox="1"/>
-          <p:nvPr/>
-        </p:nvSpPr>
-        <p:spPr>
-          <a:xfrm>
-            <a:off x="10401537" y="4582940"/>
-            <a:ext cx="939563" cy="400110"/>
-          </a:xfrm>
-          <a:prstGeom prst="rect">
-            <a:avLst/>
-          </a:prstGeom>
-          <a:gradFill>
-            <a:gsLst>
-              <a:gs pos="41000">
-                <a:srgbClr val="C00000"/>
-              </a:gs>
-              <a:gs pos="100000">
-                <a:schemeClr val="accent5">
-                  <a:shade val="90000"/>
-                  <a:lumMod val="84000"/>
-                </a:schemeClr>
-              </a:gs>
-            </a:gsLst>
-            <a:lin ang="5400000" scaled="0"/>
-          </a:gradFill>
-        </p:spPr>
-        <p:txBody>
-          <a:bodyPr wrap="square" rtlCol="1">
-            <a:spAutoFit/>
-          </a:bodyPr>
-          <a:lstStyle/>
-          <a:p>
-            <a:pPr algn="ctr"/>
-            <a:r>
-              <a:rPr lang="en-US" sz="1000" dirty="0"/>
-              <a:t>REPRICING PRODUCTS</a:t>
-            </a:r>
-            <a:endParaRPr lang="he-IL" sz="1000" dirty="0"/>
           </a:p>
         </p:txBody>
       </p:sp>
@@ -42070,120 +42070,6 @@
           <a:xfrm rot="7717306">
             <a:off x="8558746" y="3854695"/>
             <a:ext cx="241806" cy="226468"/>
-          </a:xfrm>
-          <a:prstGeom prst="downArrow">
-            <a:avLst/>
-          </a:prstGeom>
-          <a:gradFill>
-            <a:gsLst>
-              <a:gs pos="41000">
-                <a:srgbClr val="C00000"/>
-              </a:gs>
-              <a:gs pos="100000">
-                <a:schemeClr val="accent5">
-                  <a:shade val="90000"/>
-                  <a:lumMod val="84000"/>
-                </a:schemeClr>
-              </a:gs>
-            </a:gsLst>
-            <a:lin ang="5400000" scaled="0"/>
-          </a:gradFill>
-        </p:spPr>
-        <p:style>
-          <a:lnRef idx="2">
-            <a:schemeClr val="accent1">
-              <a:shade val="50000"/>
-            </a:schemeClr>
-          </a:lnRef>
-          <a:fillRef idx="1">
-            <a:schemeClr val="accent1"/>
-          </a:fillRef>
-          <a:effectRef idx="0">
-            <a:schemeClr val="accent1"/>
-          </a:effectRef>
-          <a:fontRef idx="minor">
-            <a:schemeClr val="lt1"/>
-          </a:fontRef>
-        </p:style>
-        <p:txBody>
-          <a:bodyPr rtlCol="1" anchor="ctr"/>
-          <a:lstStyle/>
-          <a:p>
-            <a:pPr algn="ctr"/>
-            <a:endParaRPr lang="he-IL" sz="1000">
-              <a:solidFill>
-                <a:schemeClr val="tx1"/>
-              </a:solidFill>
-            </a:endParaRPr>
-          </a:p>
-        </p:txBody>
-      </p:sp>
-      <p:sp>
-        <p:nvSpPr>
-          <p:cNvPr id="38" name="TextBox 37">
-            <a:extLst>
-              <a:ext uri="{FF2B5EF4-FFF2-40B4-BE49-F238E27FC236}">
-                <a16:creationId xmlns:a16="http://schemas.microsoft.com/office/drawing/2014/main" id="{3E822EEB-4646-4D3E-ACE8-055F3FCD5B26}"/>
-              </a:ext>
-            </a:extLst>
-          </p:cNvPr>
-          <p:cNvSpPr txBox="1"/>
-          <p:nvPr/>
-        </p:nvSpPr>
-        <p:spPr>
-          <a:xfrm>
-            <a:off x="8084515" y="5768933"/>
-            <a:ext cx="905844" cy="246221"/>
-          </a:xfrm>
-          <a:prstGeom prst="rect">
-            <a:avLst/>
-          </a:prstGeom>
-          <a:gradFill>
-            <a:gsLst>
-              <a:gs pos="41000">
-                <a:srgbClr val="C00000"/>
-              </a:gs>
-              <a:gs pos="100000">
-                <a:schemeClr val="accent5">
-                  <a:shade val="90000"/>
-                  <a:lumMod val="84000"/>
-                </a:schemeClr>
-              </a:gs>
-            </a:gsLst>
-            <a:lin ang="5400000" scaled="0"/>
-          </a:gradFill>
-        </p:spPr>
-        <p:txBody>
-          <a:bodyPr wrap="square" rtlCol="1">
-            <a:spAutoFit/>
-          </a:bodyPr>
-          <a:lstStyle/>
-          <a:p>
-            <a:pPr algn="ctr"/>
-            <a:r>
-              <a:rPr lang="en-US" sz="1000" dirty="0"/>
-              <a:t>PRICES</a:t>
-            </a:r>
-            <a:endParaRPr lang="he-IL" sz="1000" dirty="0"/>
-          </a:p>
-        </p:txBody>
-      </p:sp>
-      <p:sp>
-        <p:nvSpPr>
-          <p:cNvPr id="39" name="חץ: למטה 118">
-            <a:extLst>
-              <a:ext uri="{FF2B5EF4-FFF2-40B4-BE49-F238E27FC236}">
-                <a16:creationId xmlns:a16="http://schemas.microsoft.com/office/drawing/2014/main" id="{A5EF4658-BCD5-4AC2-BBBF-E2F8A679C6F9}"/>
-              </a:ext>
-            </a:extLst>
-          </p:cNvPr>
-          <p:cNvSpPr/>
-          <p:nvPr/>
-        </p:nvSpPr>
-        <p:spPr>
-          <a:xfrm rot="5400000">
-            <a:off x="9007787" y="5814540"/>
-            <a:ext cx="173502" cy="155009"/>
           </a:xfrm>
           <a:prstGeom prst="downArrow">
             <a:avLst/>
@@ -46735,6 +46621,63 @@
       </p:sp>
       <p:sp>
         <p:nvSpPr>
+          <p:cNvPr id="13" name="TextBox 12">
+            <a:extLst>
+              <a:ext uri="{FF2B5EF4-FFF2-40B4-BE49-F238E27FC236}">
+                <a16:creationId xmlns:a16="http://schemas.microsoft.com/office/drawing/2014/main" id="{1C764E6E-3153-4144-BBCC-82E005CA5FEA}"/>
+              </a:ext>
+            </a:extLst>
+          </p:cNvPr>
+          <p:cNvSpPr txBox="1"/>
+          <p:nvPr/>
+        </p:nvSpPr>
+        <p:spPr>
+          <a:xfrm>
+            <a:off x="10419268" y="4587492"/>
+            <a:ext cx="939563" cy="400110"/>
+          </a:xfrm>
+          <a:prstGeom prst="rect">
+            <a:avLst/>
+          </a:prstGeom>
+          <a:gradFill>
+            <a:gsLst>
+              <a:gs pos="41000">
+                <a:srgbClr val="C00000"/>
+              </a:gs>
+              <a:gs pos="100000">
+                <a:schemeClr val="accent5">
+                  <a:shade val="90000"/>
+                  <a:lumMod val="84000"/>
+                </a:schemeClr>
+              </a:gs>
+            </a:gsLst>
+            <a:lin ang="5400000" scaled="0"/>
+          </a:gradFill>
+        </p:spPr>
+        <p:txBody>
+          <a:bodyPr wrap="square" rtlCol="1">
+            <a:spAutoFit/>
+          </a:bodyPr>
+          <a:lstStyle>
+            <a:defPPr>
+              <a:defRPr lang="en-US"/>
+            </a:defPPr>
+            <a:lvl1pPr>
+              <a:defRPr sz="1000"/>
+            </a:lvl1pPr>
+          </a:lstStyle>
+          <a:p>
+            <a:pPr algn="ctr"/>
+            <a:r>
+              <a:rPr lang="en-US" dirty="0"/>
+              <a:t>REPRICING PRODUCTS</a:t>
+            </a:r>
+            <a:endParaRPr lang="he-IL" dirty="0"/>
+          </a:p>
+        </p:txBody>
+      </p:sp>
+      <p:sp>
+        <p:nvSpPr>
           <p:cNvPr id="14" name="TextBox 13">
             <a:extLst>
               <a:ext uri="{FF2B5EF4-FFF2-40B4-BE49-F238E27FC236}">
@@ -47882,234 +47825,6 @@
           <a:xfrm rot="7717306">
             <a:off x="8558746" y="3854695"/>
             <a:ext cx="241806" cy="226468"/>
-          </a:xfrm>
-          <a:prstGeom prst="downArrow">
-            <a:avLst/>
-          </a:prstGeom>
-          <a:gradFill>
-            <a:gsLst>
-              <a:gs pos="41000">
-                <a:srgbClr val="C00000"/>
-              </a:gs>
-              <a:gs pos="100000">
-                <a:schemeClr val="accent5">
-                  <a:shade val="90000"/>
-                  <a:lumMod val="84000"/>
-                </a:schemeClr>
-              </a:gs>
-            </a:gsLst>
-            <a:lin ang="5400000" scaled="0"/>
-          </a:gradFill>
-        </p:spPr>
-        <p:style>
-          <a:lnRef idx="2">
-            <a:schemeClr val="accent1">
-              <a:shade val="50000"/>
-            </a:schemeClr>
-          </a:lnRef>
-          <a:fillRef idx="1">
-            <a:schemeClr val="accent1"/>
-          </a:fillRef>
-          <a:effectRef idx="0">
-            <a:schemeClr val="accent1"/>
-          </a:effectRef>
-          <a:fontRef idx="minor">
-            <a:schemeClr val="lt1"/>
-          </a:fontRef>
-        </p:style>
-        <p:txBody>
-          <a:bodyPr rtlCol="1" anchor="ctr"/>
-          <a:lstStyle/>
-          <a:p>
-            <a:pPr algn="ctr"/>
-            <a:endParaRPr lang="he-IL" sz="1000">
-              <a:solidFill>
-                <a:schemeClr val="tx1"/>
-              </a:solidFill>
-            </a:endParaRPr>
-          </a:p>
-        </p:txBody>
-      </p:sp>
-      <p:sp>
-        <p:nvSpPr>
-          <p:cNvPr id="34" name="TextBox 33">
-            <a:extLst>
-              <a:ext uri="{FF2B5EF4-FFF2-40B4-BE49-F238E27FC236}">
-                <a16:creationId xmlns:a16="http://schemas.microsoft.com/office/drawing/2014/main" id="{7EFF4E51-405E-4289-8ABB-8D2A3BEFBB65}"/>
-              </a:ext>
-            </a:extLst>
-          </p:cNvPr>
-          <p:cNvSpPr txBox="1"/>
-          <p:nvPr/>
-        </p:nvSpPr>
-        <p:spPr>
-          <a:xfrm>
-            <a:off x="8084515" y="5768933"/>
-            <a:ext cx="905844" cy="246221"/>
-          </a:xfrm>
-          <a:prstGeom prst="rect">
-            <a:avLst/>
-          </a:prstGeom>
-          <a:gradFill>
-            <a:gsLst>
-              <a:gs pos="41000">
-                <a:srgbClr val="C00000"/>
-              </a:gs>
-              <a:gs pos="100000">
-                <a:schemeClr val="accent5">
-                  <a:shade val="90000"/>
-                  <a:lumMod val="84000"/>
-                </a:schemeClr>
-              </a:gs>
-            </a:gsLst>
-            <a:lin ang="5400000" scaled="0"/>
-          </a:gradFill>
-        </p:spPr>
-        <p:txBody>
-          <a:bodyPr wrap="square" rtlCol="1">
-            <a:spAutoFit/>
-          </a:bodyPr>
-          <a:lstStyle/>
-          <a:p>
-            <a:pPr algn="ctr"/>
-            <a:r>
-              <a:rPr lang="en-US" sz="1000" dirty="0"/>
-              <a:t>PRICES</a:t>
-            </a:r>
-            <a:endParaRPr lang="he-IL" sz="1000" dirty="0"/>
-          </a:p>
-        </p:txBody>
-      </p:sp>
-      <p:sp>
-        <p:nvSpPr>
-          <p:cNvPr id="35" name="חץ: למטה 118">
-            <a:extLst>
-              <a:ext uri="{FF2B5EF4-FFF2-40B4-BE49-F238E27FC236}">
-                <a16:creationId xmlns:a16="http://schemas.microsoft.com/office/drawing/2014/main" id="{91BF6EFA-F9EE-4D31-9446-0A2DEAE58F4C}"/>
-              </a:ext>
-            </a:extLst>
-          </p:cNvPr>
-          <p:cNvSpPr/>
-          <p:nvPr/>
-        </p:nvSpPr>
-        <p:spPr>
-          <a:xfrm rot="5400000">
-            <a:off x="9007787" y="5814540"/>
-            <a:ext cx="173502" cy="155009"/>
-          </a:xfrm>
-          <a:prstGeom prst="downArrow">
-            <a:avLst/>
-          </a:prstGeom>
-          <a:gradFill>
-            <a:gsLst>
-              <a:gs pos="41000">
-                <a:srgbClr val="C00000"/>
-              </a:gs>
-              <a:gs pos="100000">
-                <a:schemeClr val="accent5">
-                  <a:shade val="90000"/>
-                  <a:lumMod val="84000"/>
-                </a:schemeClr>
-              </a:gs>
-            </a:gsLst>
-            <a:lin ang="5400000" scaled="0"/>
-          </a:gradFill>
-        </p:spPr>
-        <p:style>
-          <a:lnRef idx="2">
-            <a:schemeClr val="accent1">
-              <a:shade val="50000"/>
-            </a:schemeClr>
-          </a:lnRef>
-          <a:fillRef idx="1">
-            <a:schemeClr val="accent1"/>
-          </a:fillRef>
-          <a:effectRef idx="0">
-            <a:schemeClr val="accent1"/>
-          </a:effectRef>
-          <a:fontRef idx="minor">
-            <a:schemeClr val="lt1"/>
-          </a:fontRef>
-        </p:style>
-        <p:txBody>
-          <a:bodyPr rtlCol="1" anchor="ctr"/>
-          <a:lstStyle/>
-          <a:p>
-            <a:pPr algn="ctr"/>
-            <a:endParaRPr lang="he-IL" sz="1000">
-              <a:solidFill>
-                <a:schemeClr val="tx1"/>
-              </a:solidFill>
-            </a:endParaRPr>
-          </a:p>
-        </p:txBody>
-      </p:sp>
-      <p:sp>
-        <p:nvSpPr>
-          <p:cNvPr id="36" name="TextBox 35">
-            <a:extLst>
-              <a:ext uri="{FF2B5EF4-FFF2-40B4-BE49-F238E27FC236}">
-                <a16:creationId xmlns:a16="http://schemas.microsoft.com/office/drawing/2014/main" id="{091A3C44-1124-446E-8CA0-0A75A99DAB94}"/>
-              </a:ext>
-            </a:extLst>
-          </p:cNvPr>
-          <p:cNvSpPr txBox="1"/>
-          <p:nvPr/>
-        </p:nvSpPr>
-        <p:spPr>
-          <a:xfrm>
-            <a:off x="10401537" y="4582940"/>
-            <a:ext cx="939563" cy="400110"/>
-          </a:xfrm>
-          <a:prstGeom prst="rect">
-            <a:avLst/>
-          </a:prstGeom>
-          <a:gradFill>
-            <a:gsLst>
-              <a:gs pos="41000">
-                <a:srgbClr val="C00000"/>
-              </a:gs>
-              <a:gs pos="100000">
-                <a:schemeClr val="accent5">
-                  <a:shade val="90000"/>
-                  <a:lumMod val="84000"/>
-                </a:schemeClr>
-              </a:gs>
-            </a:gsLst>
-            <a:lin ang="5400000" scaled="0"/>
-          </a:gradFill>
-        </p:spPr>
-        <p:txBody>
-          <a:bodyPr wrap="square" rtlCol="1">
-            <a:spAutoFit/>
-          </a:bodyPr>
-          <a:lstStyle/>
-          <a:p>
-            <a:pPr algn="ctr"/>
-            <a:r>
-              <a:rPr lang="en-US" sz="1000" dirty="0"/>
-              <a:t>REPRICING PRODUCTS</a:t>
-            </a:r>
-            <a:endParaRPr lang="he-IL" sz="1000" dirty="0"/>
-          </a:p>
-        </p:txBody>
-      </p:sp>
-      <p:sp>
-        <p:nvSpPr>
-          <p:cNvPr id="37" name="חץ: למטה 49">
-            <a:extLst>
-              <a:ext uri="{FF2B5EF4-FFF2-40B4-BE49-F238E27FC236}">
-                <a16:creationId xmlns:a16="http://schemas.microsoft.com/office/drawing/2014/main" id="{C7D9A23B-386F-49FF-9BB1-15B1D892F069}"/>
-              </a:ext>
-            </a:extLst>
-          </p:cNvPr>
-          <p:cNvSpPr/>
-          <p:nvPr/>
-        </p:nvSpPr>
-        <p:spPr>
-          <a:xfrm>
-            <a:off x="9560650" y="3958974"/>
-            <a:ext cx="173502" cy="155009"/>
           </a:xfrm>
           <a:prstGeom prst="downArrow">
             <a:avLst/>

</xml_diff>